<commit_message>
edited the h3 tags
</commit_message>
<xml_diff>
--- a/assets/Journal Now Presentation.pptx
+++ b/assets/Journal Now Presentation.pptx
@@ -1328,12 +1328,12 @@
         </a:fontRef>
       </dsp:style>
       <dsp:txBody>
-        <a:bodyPr spcFirstLastPara="0" vert="horz" wrap="square" lIns="53340" tIns="53340" rIns="53340" bIns="53340" numCol="1" spcCol="1270" anchor="ctr" anchorCtr="0">
+        <a:bodyPr spcFirstLastPara="0" vert="horz" wrap="square" lIns="49530" tIns="49530" rIns="49530" bIns="49530" numCol="1" spcCol="1270" anchor="ctr" anchorCtr="0">
           <a:noAutofit/>
         </a:bodyPr>
         <a:lstStyle/>
         <a:p>
-          <a:pPr marL="0" lvl="0" indent="0" algn="ctr" defTabSz="622300">
+          <a:pPr marL="0" lvl="0" indent="0" algn="ctr" defTabSz="577850">
             <a:lnSpc>
               <a:spcPct val="90000"/>
             </a:lnSpc>
@@ -1346,7 +1346,7 @@
             <a:buNone/>
           </a:pPr>
           <a:r>
-            <a:rPr lang="en-US" sz="1400" kern="1200" dirty="0"/>
+            <a:rPr lang="en-US" sz="1300" kern="1200" dirty="0"/>
             <a:t>Captured screen shots for design inspiration</a:t>
           </a:r>
         </a:p>
@@ -6126,8 +6126,8 @@
             <a:r>
               <a:rPr lang="en-US" sz="2800" b="1" dirty="0">
                 <a:solidFill>
-                  <a:schemeClr val="tx1">
-                    <a:lumMod val="95000"/>
+                  <a:schemeClr val="accent4">
+                    <a:lumMod val="50000"/>
                   </a:schemeClr>
                 </a:solidFill>
               </a:rPr>
@@ -6276,9 +6276,7 @@
     <p:bg>
       <p:bgPr>
         <a:solidFill>
-          <a:schemeClr val="bg1">
-            <a:lumMod val="95000"/>
-          </a:schemeClr>
+          <a:schemeClr val="bg2"/>
         </a:solidFill>
         <a:effectLst/>
       </p:bgPr>
@@ -6315,8 +6313,8 @@
         </p:nvSpPr>
         <p:spPr>
           <a:xfrm>
-            <a:off x="1196961" y="964692"/>
-            <a:ext cx="10034919" cy="1188720"/>
+            <a:off x="804672" y="964692"/>
+            <a:ext cx="3066937" cy="1188720"/>
           </a:xfrm>
         </p:spPr>
         <p:txBody>
@@ -6326,10 +6324,9 @@
           <a:lstStyle/>
           <a:p>
             <a:r>
-              <a:rPr lang="en-US" dirty="0" err="1"/>
-              <a:t>Javascript</a:t>
-            </a:r>
-            <a:endParaRPr lang="en-US" dirty="0"/>
+              <a:rPr lang="en-US" dirty="0"/>
+              <a:t>JavaScript</a:t>
+            </a:r>
           </a:p>
         </p:txBody>
       </p:sp>
@@ -6351,71 +6348,278 @@
         </p:nvSpPr>
         <p:spPr>
           <a:xfrm>
-            <a:off x="1974376" y="2950590"/>
-            <a:ext cx="8793708" cy="3507997"/>
+            <a:off x="803244" y="2638044"/>
+            <a:ext cx="3063765" cy="3263206"/>
           </a:xfrm>
         </p:spPr>
         <p:txBody>
           <a:bodyPr>
-            <a:normAutofit lnSpcReduction="10000"/>
+            <a:normAutofit/>
           </a:bodyPr>
           <a:lstStyle/>
           <a:p>
-            <a:r>
-              <a:rPr lang="en-US" sz="2800" dirty="0"/>
+            <a:pPr>
+              <a:lnSpc>
+                <a:spcPct val="90000"/>
+              </a:lnSpc>
+            </a:pPr>
+            <a:r>
+              <a:rPr lang="en-US" sz="1100" dirty="0"/>
               <a:t>JAVASCRIPT </a:t>
             </a:r>
           </a:p>
           <a:p>
-            <a:r>
-              <a:rPr lang="en-US" dirty="0"/>
+            <a:pPr>
+              <a:lnSpc>
+                <a:spcPct val="90000"/>
+              </a:lnSpc>
+            </a:pPr>
+            <a:r>
+              <a:rPr lang="en-US" sz="1100" dirty="0"/>
               <a:t>Created js. folder</a:t>
             </a:r>
           </a:p>
           <a:p>
-            <a:r>
-              <a:rPr lang="en-US" dirty="0"/>
+            <a:pPr>
+              <a:lnSpc>
+                <a:spcPct val="90000"/>
+              </a:lnSpc>
+            </a:pPr>
+            <a:r>
+              <a:rPr lang="en-US" sz="1100" dirty="0"/>
               <a:t>Created first js. File app.js for index page</a:t>
             </a:r>
           </a:p>
           <a:p>
-            <a:r>
-              <a:rPr lang="en-US" dirty="0"/>
+            <a:pPr>
+              <a:lnSpc>
+                <a:spcPct val="90000"/>
+              </a:lnSpc>
+            </a:pPr>
+            <a:r>
+              <a:rPr lang="en-US" sz="1100" dirty="0"/>
               <a:t>Created second js. File dashboard.js</a:t>
             </a:r>
           </a:p>
           <a:p>
-            <a:r>
-              <a:rPr lang="en-US" dirty="0"/>
+            <a:pPr>
+              <a:lnSpc>
+                <a:spcPct val="90000"/>
+              </a:lnSpc>
+            </a:pPr>
+            <a:r>
+              <a:rPr lang="en-US" sz="1100" dirty="0"/>
               <a:t>Validated inputs for app.js file</a:t>
             </a:r>
           </a:p>
           <a:p>
-            <a:r>
-              <a:rPr lang="en-US" dirty="0"/>
+            <a:pPr>
+              <a:lnSpc>
+                <a:spcPct val="90000"/>
+              </a:lnSpc>
+            </a:pPr>
+            <a:r>
+              <a:rPr lang="en-US" sz="1100" dirty="0"/>
               <a:t>Created event listener for the index page sign in form directing user to dashboard page</a:t>
             </a:r>
           </a:p>
           <a:p>
-            <a:r>
-              <a:rPr lang="en-US" dirty="0"/>
+            <a:pPr>
+              <a:lnSpc>
+                <a:spcPct val="90000"/>
+              </a:lnSpc>
+            </a:pPr>
+            <a:r>
+              <a:rPr lang="en-US" sz="1100" dirty="0"/>
               <a:t>Validated inputs for dashboard.js</a:t>
             </a:r>
           </a:p>
           <a:p>
-            <a:r>
-              <a:rPr lang="en-US" dirty="0"/>
+            <a:pPr>
+              <a:lnSpc>
+                <a:spcPct val="90000"/>
+              </a:lnSpc>
+            </a:pPr>
+            <a:r>
+              <a:rPr lang="en-US" sz="1100" dirty="0"/>
               <a:t>Created event listener for the dashboard form which enabled user to add their story to company intranet </a:t>
             </a:r>
           </a:p>
           <a:p>
+            <a:pPr>
+              <a:lnSpc>
+                <a:spcPct val="90000"/>
+              </a:lnSpc>
+            </a:pPr>
+            <a:endParaRPr lang="en-US" sz="1100" dirty="0"/>
+          </a:p>
+          <a:p>
+            <a:pPr>
+              <a:lnSpc>
+                <a:spcPct val="90000"/>
+              </a:lnSpc>
+            </a:pPr>
+            <a:endParaRPr lang="en-US" sz="1100" dirty="0"/>
+          </a:p>
+        </p:txBody>
+      </p:sp>
+      <p:sp>
+        <p:nvSpPr>
+          <p:cNvPr id="11" name="Rectangle 10">
+            <a:extLst>
+              <a:ext uri="{FF2B5EF4-FFF2-40B4-BE49-F238E27FC236}">
+                <a16:creationId xmlns:a16="http://schemas.microsoft.com/office/drawing/2014/main" id="{9614522A-C691-4F68-84C3-4ABAD2F7B61A}"/>
+              </a:ext>
+              <a:ext uri="{C183D7F6-B498-43B3-948B-1728B52AA6E4}">
+                <adec:decorative xmlns:adec="http://schemas.microsoft.com/office/drawing/2017/decorative" val="1"/>
+              </a:ext>
+            </a:extLst>
+          </p:cNvPr>
+          <p:cNvSpPr>
+            <a:spLocks noGrp="1" noRot="1" noChangeAspect="1" noMove="1" noResize="1" noEditPoints="1" noAdjustHandles="1" noChangeArrowheads="1" noChangeShapeType="1" noTextEdit="1"/>
+          </p:cNvSpPr>
+          <p:nvPr>
+            <p:extLst>
+              <p:ext uri="{386F3935-93C4-4BCD-93E2-E3B085C9AB24}">
+                <p16:designElem xmlns:p16="http://schemas.microsoft.com/office/powerpoint/2015/main" val="1"/>
+              </p:ext>
+            </p:extLst>
+          </p:nvPr>
+        </p:nvSpPr>
+        <p:spPr>
+          <a:xfrm>
+            <a:off x="4494182" y="964692"/>
+            <a:ext cx="6885432" cy="4936558"/>
+          </a:xfrm>
+          <a:prstGeom prst="rect">
+            <a:avLst/>
+          </a:prstGeom>
+          <a:noFill/>
+          <a:ln w="31750" cap="sq">
+            <a:solidFill>
+              <a:srgbClr val="FFFFFF"/>
+            </a:solidFill>
+            <a:miter lim="800000"/>
+          </a:ln>
+        </p:spPr>
+        <p:style>
+          <a:lnRef idx="2">
+            <a:schemeClr val="accent1">
+              <a:shade val="50000"/>
+            </a:schemeClr>
+          </a:lnRef>
+          <a:fillRef idx="1">
+            <a:schemeClr val="accent1"/>
+          </a:fillRef>
+          <a:effectRef idx="0">
+            <a:schemeClr val="accent1"/>
+          </a:effectRef>
+          <a:fontRef idx="minor">
+            <a:schemeClr val="lt1"/>
+          </a:fontRef>
+        </p:style>
+        <p:txBody>
+          <a:bodyPr rtlCol="0" anchor="ctr"/>
+          <a:lstStyle/>
+          <a:p>
+            <a:pPr algn="ctr"/>
             <a:endParaRPr lang="en-US" dirty="0"/>
           </a:p>
-          <a:p>
-            <a:endParaRPr lang="en-US" dirty="0"/>
-          </a:p>
-        </p:txBody>
-      </p:sp>
+        </p:txBody>
+      </p:sp>
+      <p:sp>
+        <p:nvSpPr>
+          <p:cNvPr id="13" name="Rectangle 12">
+            <a:extLst>
+              <a:ext uri="{FF2B5EF4-FFF2-40B4-BE49-F238E27FC236}">
+                <a16:creationId xmlns:a16="http://schemas.microsoft.com/office/drawing/2014/main" id="{D5A2F9AC-B2D0-4F61-B15D-48754CA253A5}"/>
+              </a:ext>
+              <a:ext uri="{C183D7F6-B498-43B3-948B-1728B52AA6E4}">
+                <adec:decorative xmlns:adec="http://schemas.microsoft.com/office/drawing/2017/decorative" val="1"/>
+              </a:ext>
+            </a:extLst>
+          </p:cNvPr>
+          <p:cNvSpPr>
+            <a:spLocks noGrp="1" noRot="1" noChangeAspect="1" noMove="1" noResize="1" noEditPoints="1" noAdjustHandles="1" noChangeArrowheads="1" noChangeShapeType="1" noTextEdit="1"/>
+          </p:cNvSpPr>
+          <p:nvPr>
+            <p:extLst>
+              <p:ext uri="{386F3935-93C4-4BCD-93E2-E3B085C9AB24}">
+                <p16:designElem xmlns:p16="http://schemas.microsoft.com/office/powerpoint/2015/main" val="1"/>
+              </p:ext>
+            </p:extLst>
+          </p:nvPr>
+        </p:nvSpPr>
+        <p:spPr>
+          <a:xfrm>
+            <a:off x="4657802" y="1128683"/>
+            <a:ext cx="6558192" cy="4608576"/>
+          </a:xfrm>
+          <a:prstGeom prst="rect">
+            <a:avLst/>
+          </a:prstGeom>
+          <a:solidFill>
+            <a:srgbClr val="FFFFFF"/>
+          </a:solidFill>
+          <a:ln>
+            <a:noFill/>
+          </a:ln>
+        </p:spPr>
+        <p:style>
+          <a:lnRef idx="2">
+            <a:schemeClr val="accent1">
+              <a:shade val="50000"/>
+            </a:schemeClr>
+          </a:lnRef>
+          <a:fillRef idx="1">
+            <a:schemeClr val="accent1"/>
+          </a:fillRef>
+          <a:effectRef idx="0">
+            <a:schemeClr val="accent1"/>
+          </a:effectRef>
+          <a:fontRef idx="minor">
+            <a:schemeClr val="lt1"/>
+          </a:fontRef>
+        </p:style>
+        <p:txBody>
+          <a:bodyPr rtlCol="0" anchor="ctr"/>
+          <a:lstStyle/>
+          <a:p>
+            <a:pPr algn="ctr"/>
+            <a:endParaRPr lang="en-US"/>
+          </a:p>
+        </p:txBody>
+      </p:sp>
+      <p:pic>
+        <p:nvPicPr>
+          <p:cNvPr id="4" name="Picture 3">
+            <a:extLst>
+              <a:ext uri="{FF2B5EF4-FFF2-40B4-BE49-F238E27FC236}">
+                <a16:creationId xmlns:a16="http://schemas.microsoft.com/office/drawing/2014/main" id="{EF0DDB1A-7429-4220-9CE4-4454CEF79798}"/>
+              </a:ext>
+            </a:extLst>
+          </p:cNvPr>
+          <p:cNvPicPr>
+            <a:picLocks noChangeAspect="1"/>
+          </p:cNvPicPr>
+          <p:nvPr/>
+        </p:nvPicPr>
+        <p:blipFill>
+          <a:blip r:embed="rId2"/>
+          <a:stretch>
+            <a:fillRect/>
+          </a:stretch>
+        </p:blipFill>
+        <p:spPr>
+          <a:xfrm>
+            <a:off x="4858199" y="1293275"/>
+            <a:ext cx="6157398" cy="4279392"/>
+          </a:xfrm>
+          <a:prstGeom prst="rect">
+            <a:avLst/>
+          </a:prstGeom>
+        </p:spPr>
+      </p:pic>
     </p:spTree>
     <p:extLst>
       <p:ext uri="{BB962C8B-B14F-4D97-AF65-F5344CB8AC3E}">
@@ -6516,8 +6720,8 @@
             <a:r>
               <a:rPr lang="en-US" sz="2800" b="1" dirty="0">
                 <a:solidFill>
-                  <a:schemeClr val="tx1">
-                    <a:lumMod val="95000"/>
+                  <a:schemeClr val="accent4">
+                    <a:lumMod val="50000"/>
                   </a:schemeClr>
                 </a:solidFill>
               </a:rPr>
@@ -6532,8 +6736,8 @@
             <a:r>
               <a:rPr lang="en-US" sz="2800" b="1" dirty="0">
                 <a:solidFill>
-                  <a:schemeClr val="tx1">
-                    <a:lumMod val="95000"/>
+                  <a:schemeClr val="accent4">
+                    <a:lumMod val="50000"/>
                   </a:schemeClr>
                 </a:solidFill>
               </a:rPr>
@@ -6548,8 +6752,8 @@
             <a:r>
               <a:rPr lang="en-US" sz="2800" b="1" dirty="0">
                 <a:solidFill>
-                  <a:schemeClr val="tx1">
-                    <a:lumMod val="95000"/>
+                  <a:schemeClr val="accent4">
+                    <a:lumMod val="50000"/>
                   </a:schemeClr>
                 </a:solidFill>
               </a:rPr>
@@ -6666,164 +6870,190 @@
       </p:graphicFrame>
       <p:pic>
         <p:nvPicPr>
-          <p:cNvPr id="5" name="Picture 4">
+          <p:cNvPr id="1026" name="Picture 2" descr="The best journaling apps for iPhone and iPad">
             <a:extLst>
               <a:ext uri="{FF2B5EF4-FFF2-40B4-BE49-F238E27FC236}">
-                <a16:creationId xmlns:a16="http://schemas.microsoft.com/office/drawing/2014/main" id="{FFB29011-B32B-4566-A4C8-3A7FEB8544B5}"/>
+                <a16:creationId xmlns:a16="http://schemas.microsoft.com/office/drawing/2014/main" id="{D0E93035-5B53-4E74-9431-F98DE86E5F61}"/>
               </a:ext>
             </a:extLst>
           </p:cNvPr>
           <p:cNvPicPr>
-            <a:picLocks noChangeAspect="1"/>
+            <a:picLocks noChangeAspect="1" noChangeArrowheads="1"/>
           </p:cNvPicPr>
           <p:nvPr/>
         </p:nvPicPr>
         <p:blipFill>
-          <a:blip r:embed="rId7"/>
+          <a:blip r:embed="rId7">
+            <a:extLst>
+              <a:ext uri="{28A0092B-C50C-407E-A947-70E740481C1C}">
+                <a14:useLocalDpi xmlns:a14="http://schemas.microsoft.com/office/drawing/2010/main" val="0"/>
+              </a:ext>
+            </a:extLst>
+          </a:blip>
+          <a:srcRect/>
           <a:stretch>
             <a:fillRect/>
           </a:stretch>
         </p:blipFill>
-        <p:spPr>
+        <p:spPr bwMode="auto">
           <a:xfrm>
-            <a:off x="4704522" y="2449727"/>
-            <a:ext cx="2820953" cy="1911194"/>
+            <a:off x="5024438" y="2362200"/>
+            <a:ext cx="2143125" cy="2133600"/>
           </a:xfrm>
           <a:prstGeom prst="rect">
             <a:avLst/>
           </a:prstGeom>
-          <a:ln w="31750" cap="sq">
-            <a:solidFill>
-              <a:srgbClr val="FFFFFF"/>
-            </a:solidFill>
-            <a:miter lim="800000"/>
-          </a:ln>
+          <a:noFill/>
+          <a:extLst>
+            <a:ext uri="{909E8E84-426E-40DD-AFC4-6F175D3DCCD1}">
+              <a14:hiddenFill xmlns:a14="http://schemas.microsoft.com/office/drawing/2010/main">
+                <a:solidFill>
+                  <a:srgbClr val="FFFFFF"/>
+                </a:solidFill>
+              </a14:hiddenFill>
+            </a:ext>
+          </a:extLst>
         </p:spPr>
       </p:pic>
       <p:pic>
         <p:nvPicPr>
-          <p:cNvPr id="7" name="Picture 6">
+          <p:cNvPr id="1032" name="Picture 8" descr="The best journaling apps for iPhone and iPad">
             <a:extLst>
               <a:ext uri="{FF2B5EF4-FFF2-40B4-BE49-F238E27FC236}">
-                <a16:creationId xmlns:a16="http://schemas.microsoft.com/office/drawing/2014/main" id="{C9CB9318-2224-4622-81A9-20C94DFB04D2}"/>
+                <a16:creationId xmlns:a16="http://schemas.microsoft.com/office/drawing/2014/main" id="{4CB9EB90-C874-4E44-807F-34C63C646F4C}"/>
               </a:ext>
             </a:extLst>
           </p:cNvPr>
           <p:cNvPicPr>
-            <a:picLocks noChangeAspect="1"/>
+            <a:picLocks noChangeAspect="1" noChangeArrowheads="1"/>
           </p:cNvPicPr>
           <p:nvPr/>
         </p:nvPicPr>
         <p:blipFill>
-          <a:blip r:embed="rId8"/>
+          <a:blip r:embed="rId8">
+            <a:extLst>
+              <a:ext uri="{28A0092B-C50C-407E-A947-70E740481C1C}">
+                <a14:useLocalDpi xmlns:a14="http://schemas.microsoft.com/office/drawing/2010/main" val="0"/>
+              </a:ext>
+            </a:extLst>
+          </a:blip>
+          <a:srcRect/>
           <a:stretch>
             <a:fillRect/>
           </a:stretch>
         </p:blipFill>
-        <p:spPr>
+        <p:spPr bwMode="auto">
           <a:xfrm>
-            <a:off x="8035236" y="2485897"/>
-            <a:ext cx="3196644" cy="1841878"/>
+            <a:off x="7888771" y="2362200"/>
+            <a:ext cx="2152650" cy="2124075"/>
           </a:xfrm>
           <a:prstGeom prst="rect">
             <a:avLst/>
           </a:prstGeom>
-          <a:ln w="31750" cap="sq">
-            <a:solidFill>
-              <a:srgbClr val="FFFFFF"/>
-            </a:solidFill>
-            <a:miter lim="800000"/>
-          </a:ln>
+          <a:noFill/>
+          <a:extLst>
+            <a:ext uri="{909E8E84-426E-40DD-AFC4-6F175D3DCCD1}">
+              <a14:hiddenFill xmlns:a14="http://schemas.microsoft.com/office/drawing/2010/main">
+                <a:solidFill>
+                  <a:srgbClr val="FFFFFF"/>
+                </a:solidFill>
+              </a14:hiddenFill>
+            </a:ext>
+          </a:extLst>
         </p:spPr>
       </p:pic>
       <p:pic>
         <p:nvPicPr>
-          <p:cNvPr id="9" name="Picture 8">
+          <p:cNvPr id="1034" name="Picture 10" descr="Journal App designs, themes, templates and downloadable graphic elements on  Dribbble">
             <a:extLst>
               <a:ext uri="{FF2B5EF4-FFF2-40B4-BE49-F238E27FC236}">
-                <a16:creationId xmlns:a16="http://schemas.microsoft.com/office/drawing/2014/main" id="{72553E39-2E1E-49E4-9BDF-88CA1EC45D7F}"/>
+                <a16:creationId xmlns:a16="http://schemas.microsoft.com/office/drawing/2014/main" id="{82C11DB6-EC46-4665-BA04-8AEB8018CFEA}"/>
               </a:ext>
             </a:extLst>
           </p:cNvPr>
           <p:cNvPicPr>
-            <a:picLocks noChangeAspect="1"/>
+            <a:picLocks noChangeAspect="1" noChangeArrowheads="1"/>
           </p:cNvPicPr>
           <p:nvPr/>
         </p:nvPicPr>
         <p:blipFill>
-          <a:blip r:embed="rId9"/>
+          <a:blip r:embed="rId9">
+            <a:extLst>
+              <a:ext uri="{28A0092B-C50C-407E-A947-70E740481C1C}">
+                <a14:useLocalDpi xmlns:a14="http://schemas.microsoft.com/office/drawing/2010/main" val="0"/>
+              </a:ext>
+            </a:extLst>
+          </a:blip>
+          <a:srcRect/>
           <a:stretch>
             <a:fillRect/>
           </a:stretch>
         </p:blipFill>
-        <p:spPr>
+        <p:spPr bwMode="auto">
           <a:xfrm>
-            <a:off x="4667773" y="4760623"/>
-            <a:ext cx="2820953" cy="1722130"/>
+            <a:off x="5024438" y="4704588"/>
+            <a:ext cx="2143125" cy="1847850"/>
           </a:xfrm>
           <a:prstGeom prst="rect">
             <a:avLst/>
           </a:prstGeom>
+          <a:noFill/>
+          <a:extLst>
+            <a:ext uri="{909E8E84-426E-40DD-AFC4-6F175D3DCCD1}">
+              <a14:hiddenFill xmlns:a14="http://schemas.microsoft.com/office/drawing/2010/main">
+                <a:solidFill>
+                  <a:srgbClr val="FFFFFF"/>
+                </a:solidFill>
+              </a14:hiddenFill>
+            </a:ext>
+          </a:extLst>
         </p:spPr>
       </p:pic>
       <p:pic>
         <p:nvPicPr>
-          <p:cNvPr id="11" name="Picture 10">
+          <p:cNvPr id="1036" name="Picture 12" descr="Prompted Journal — Raccoon Technology (DarlingApps)">
             <a:extLst>
               <a:ext uri="{FF2B5EF4-FFF2-40B4-BE49-F238E27FC236}">
-                <a16:creationId xmlns:a16="http://schemas.microsoft.com/office/drawing/2014/main" id="{D0599D5C-0D85-4867-A438-05DB873ACE1C}"/>
+                <a16:creationId xmlns:a16="http://schemas.microsoft.com/office/drawing/2014/main" id="{37EB3B9F-4B51-47E4-AD5E-6565A259C899}"/>
               </a:ext>
             </a:extLst>
           </p:cNvPr>
           <p:cNvPicPr>
-            <a:picLocks noChangeAspect="1"/>
+            <a:picLocks noChangeAspect="1" noChangeArrowheads="1"/>
           </p:cNvPicPr>
           <p:nvPr/>
         </p:nvPicPr>
         <p:blipFill>
-          <a:blip r:embed="rId10"/>
+          <a:blip r:embed="rId10">
+            <a:extLst>
+              <a:ext uri="{28A0092B-C50C-407E-A947-70E740481C1C}">
+                <a14:useLocalDpi xmlns:a14="http://schemas.microsoft.com/office/drawing/2010/main" val="0"/>
+              </a:ext>
+            </a:extLst>
+          </a:blip>
+          <a:srcRect/>
           <a:stretch>
             <a:fillRect/>
           </a:stretch>
         </p:blipFill>
-        <p:spPr>
+        <p:spPr bwMode="auto">
           <a:xfrm>
-            <a:off x="8035236" y="4769966"/>
-            <a:ext cx="1508978" cy="1733835"/>
+            <a:off x="8153815" y="4576212"/>
+            <a:ext cx="1705803" cy="2065360"/>
           </a:xfrm>
           <a:prstGeom prst="rect">
             <a:avLst/>
           </a:prstGeom>
-        </p:spPr>
-      </p:pic>
-      <p:pic>
-        <p:nvPicPr>
-          <p:cNvPr id="15" name="Picture 14">
-            <a:extLst>
-              <a:ext uri="{FF2B5EF4-FFF2-40B4-BE49-F238E27FC236}">
-                <a16:creationId xmlns:a16="http://schemas.microsoft.com/office/drawing/2014/main" id="{04CCAAD8-2171-49A9-B797-A8A928948A30}"/>
-              </a:ext>
-            </a:extLst>
-          </p:cNvPr>
-          <p:cNvPicPr>
-            <a:picLocks noChangeAspect="1"/>
-          </p:cNvPicPr>
-          <p:nvPr/>
-        </p:nvPicPr>
-        <p:blipFill>
-          <a:blip r:embed="rId11"/>
-          <a:stretch>
-            <a:fillRect/>
-          </a:stretch>
-        </p:blipFill>
-        <p:spPr>
-          <a:xfrm>
-            <a:off x="9701878" y="4769966"/>
-            <a:ext cx="1530001" cy="1722130"/>
-          </a:xfrm>
-          <a:prstGeom prst="rect">
-            <a:avLst/>
-          </a:prstGeom>
+          <a:noFill/>
+          <a:extLst>
+            <a:ext uri="{909E8E84-426E-40DD-AFC4-6F175D3DCCD1}">
+              <a14:hiddenFill xmlns:a14="http://schemas.microsoft.com/office/drawing/2010/main">
+                <a:solidFill>
+                  <a:srgbClr val="FFFFFF"/>
+                </a:solidFill>
+              </a14:hiddenFill>
+            </a:ext>
+          </a:extLst>
         </p:spPr>
       </p:pic>
     </p:spTree>
@@ -6935,11 +7165,10 @@
               <a:buNone/>
             </a:pPr>
             <a:r>
-              <a:rPr lang="en-US" sz="2000">
+              <a:rPr lang="en-US" sz="2800" dirty="0">
                 <a:solidFill>
-                  <a:schemeClr val="tx1">
-                    <a:lumMod val="75000"/>
-                    <a:lumOff val="25000"/>
+                  <a:schemeClr val="accent4">
+                    <a:lumMod val="50000"/>
                   </a:schemeClr>
                 </a:solidFill>
               </a:rPr>
@@ -7199,7 +7428,7 @@
         <p:spPr>
           <a:xfrm>
             <a:off x="2231136" y="2638044"/>
-            <a:ext cx="4126495" cy="2813036"/>
+            <a:ext cx="4126495" cy="1899653"/>
           </a:xfrm>
         </p:spPr>
         <p:txBody>
@@ -7224,7 +7453,7 @@
             <a:r>
               <a:rPr lang="en-US" sz="1400" b="0" i="0" dirty="0">
                 <a:solidFill>
-                  <a:srgbClr val="202124"/>
+                  <a:schemeClr val="tx1"/>
                 </a:solidFill>
                 <a:effectLst/>
                 <a:latin typeface="Roboto" panose="02000000000000000000" pitchFamily="2" charset="0"/>
@@ -7240,7 +7469,7 @@
             <a:r>
               <a:rPr lang="en-US" sz="1400" b="0" i="0" dirty="0">
                 <a:solidFill>
-                  <a:srgbClr val="202124"/>
+                  <a:schemeClr val="tx1"/>
                 </a:solidFill>
                 <a:effectLst/>
                 <a:latin typeface="Roboto" panose="02000000000000000000" pitchFamily="2" charset="0"/>
@@ -7256,7 +7485,7 @@
             <a:r>
               <a:rPr lang="en-US" sz="1400" b="0" i="0" dirty="0">
                 <a:solidFill>
-                  <a:srgbClr val="202124"/>
+                  <a:schemeClr val="tx1"/>
                 </a:solidFill>
                 <a:effectLst/>
                 <a:latin typeface="Roboto" panose="02000000000000000000" pitchFamily="2" charset="0"/>
@@ -7272,7 +7501,7 @@
             <a:r>
               <a:rPr lang="en-US" sz="1400" b="0" i="0" dirty="0">
                 <a:solidFill>
-                  <a:srgbClr val="202124"/>
+                  <a:schemeClr val="tx1"/>
                 </a:solidFill>
                 <a:effectLst/>
                 <a:latin typeface="Roboto" panose="02000000000000000000" pitchFamily="2" charset="0"/>
@@ -7305,7 +7534,7 @@
         <p:spPr>
           <a:xfrm>
             <a:off x="6901247" y="2602111"/>
-            <a:ext cx="4044082" cy="2640972"/>
+            <a:ext cx="4044082" cy="1763939"/>
           </a:xfrm>
           <a:prstGeom prst="rect">
             <a:avLst/>
@@ -7558,156 +7787,198 @@
           </a:p>
         </p:txBody>
       </p:sp>
-      <p:pic>
-        <p:nvPicPr>
-          <p:cNvPr id="6" name="Picture 5" descr="A picture containing chart&#10;&#10;Description automatically generated">
+      <p:grpSp>
+        <p:nvGrpSpPr>
+          <p:cNvPr id="3" name="Group 2">
             <a:extLst>
               <a:ext uri="{FF2B5EF4-FFF2-40B4-BE49-F238E27FC236}">
-                <a16:creationId xmlns:a16="http://schemas.microsoft.com/office/drawing/2014/main" id="{F63A59E3-FABE-4567-91E7-39070B74FA75}"/>
+                <a16:creationId xmlns:a16="http://schemas.microsoft.com/office/drawing/2014/main" id="{3CC8123B-7571-42F1-BDB0-711A5216A951}"/>
               </a:ext>
             </a:extLst>
           </p:cNvPr>
-          <p:cNvPicPr>
-            <a:picLocks noChangeAspect="1"/>
-          </p:cNvPicPr>
+          <p:cNvGrpSpPr/>
           <p:nvPr/>
-        </p:nvPicPr>
-        <p:blipFill>
-          <a:blip r:embed="rId2"/>
-          <a:stretch>
-            <a:fillRect/>
-          </a:stretch>
-        </p:blipFill>
-        <p:spPr>
+        </p:nvGrpSpPr>
+        <p:grpSpPr>
           <a:xfrm>
-            <a:off x="2365612" y="4537697"/>
-            <a:ext cx="2351917" cy="536418"/>
+            <a:off x="2319677" y="4592132"/>
+            <a:ext cx="2151655" cy="1856005"/>
+            <a:chOff x="1505945" y="4537697"/>
+            <a:chExt cx="2411057" cy="2079764"/>
           </a:xfrm>
-          <a:prstGeom prst="rect">
-            <a:avLst/>
-          </a:prstGeom>
-        </p:spPr>
-      </p:pic>
-      <p:pic>
-        <p:nvPicPr>
-          <p:cNvPr id="8" name="Picture 7" descr="Chart, treemap chart&#10;&#10;Description automatically generated">
+        </p:grpSpPr>
+        <p:pic>
+          <p:nvPicPr>
+            <p:cNvPr id="6" name="Picture 5" descr="A picture containing chart&#10;&#10;Description automatically generated">
+              <a:extLst>
+                <a:ext uri="{FF2B5EF4-FFF2-40B4-BE49-F238E27FC236}">
+                  <a16:creationId xmlns:a16="http://schemas.microsoft.com/office/drawing/2014/main" id="{F63A59E3-FABE-4567-91E7-39070B74FA75}"/>
+                </a:ext>
+              </a:extLst>
+            </p:cNvPr>
+            <p:cNvPicPr>
+              <a:picLocks noChangeAspect="1"/>
+            </p:cNvPicPr>
+            <p:nvPr/>
+          </p:nvPicPr>
+          <p:blipFill>
+            <a:blip r:embed="rId2"/>
+            <a:stretch>
+              <a:fillRect/>
+            </a:stretch>
+          </p:blipFill>
+          <p:spPr>
+            <a:xfrm>
+              <a:off x="1535516" y="5283684"/>
+              <a:ext cx="2351917" cy="536418"/>
+            </a:xfrm>
+            <a:prstGeom prst="rect">
+              <a:avLst/>
+            </a:prstGeom>
+          </p:spPr>
+        </p:pic>
+        <p:pic>
+          <p:nvPicPr>
+            <p:cNvPr id="8" name="Picture 7" descr="Chart, treemap chart&#10;&#10;Description automatically generated">
+              <a:extLst>
+                <a:ext uri="{FF2B5EF4-FFF2-40B4-BE49-F238E27FC236}">
+                  <a16:creationId xmlns:a16="http://schemas.microsoft.com/office/drawing/2014/main" id="{F20A803E-8B80-4633-996F-498104412A36}"/>
+                </a:ext>
+              </a:extLst>
+            </p:cNvPr>
+            <p:cNvPicPr>
+              <a:picLocks noChangeAspect="1"/>
+            </p:cNvPicPr>
+            <p:nvPr/>
+          </p:nvPicPr>
+          <p:blipFill>
+            <a:blip r:embed="rId3"/>
+            <a:stretch>
+              <a:fillRect/>
+            </a:stretch>
+          </p:blipFill>
+          <p:spPr>
+            <a:xfrm>
+              <a:off x="1535516" y="6022185"/>
+              <a:ext cx="2351917" cy="595276"/>
+            </a:xfrm>
+            <a:prstGeom prst="rect">
+              <a:avLst/>
+            </a:prstGeom>
+          </p:spPr>
+        </p:pic>
+        <p:pic>
+          <p:nvPicPr>
+            <p:cNvPr id="10" name="Picture 9" descr="A picture containing graphical user interface&#10;&#10;Description automatically generated">
+              <a:extLst>
+                <a:ext uri="{FF2B5EF4-FFF2-40B4-BE49-F238E27FC236}">
+                  <a16:creationId xmlns:a16="http://schemas.microsoft.com/office/drawing/2014/main" id="{95A33E60-BD04-41E0-93CC-5B4DE9E1D273}"/>
+                </a:ext>
+              </a:extLst>
+            </p:cNvPr>
+            <p:cNvPicPr>
+              <a:picLocks noChangeAspect="1"/>
+            </p:cNvPicPr>
+            <p:nvPr/>
+          </p:nvPicPr>
+          <p:blipFill>
+            <a:blip r:embed="rId4"/>
+            <a:stretch>
+              <a:fillRect/>
+            </a:stretch>
+          </p:blipFill>
+          <p:spPr>
+            <a:xfrm>
+              <a:off x="1505945" y="4537697"/>
+              <a:ext cx="2411057" cy="536418"/>
+            </a:xfrm>
+            <a:prstGeom prst="rect">
+              <a:avLst/>
+            </a:prstGeom>
+          </p:spPr>
+        </p:pic>
+      </p:grpSp>
+      <p:grpSp>
+        <p:nvGrpSpPr>
+          <p:cNvPr id="7" name="Group 6">
             <a:extLst>
               <a:ext uri="{FF2B5EF4-FFF2-40B4-BE49-F238E27FC236}">
-                <a16:creationId xmlns:a16="http://schemas.microsoft.com/office/drawing/2014/main" id="{F20A803E-8B80-4633-996F-498104412A36}"/>
+                <a16:creationId xmlns:a16="http://schemas.microsoft.com/office/drawing/2014/main" id="{070878AE-2ECB-42D2-8C84-82D976AA248F}"/>
               </a:ext>
             </a:extLst>
           </p:cNvPr>
-          <p:cNvPicPr>
-            <a:picLocks noChangeAspect="1"/>
-          </p:cNvPicPr>
+          <p:cNvGrpSpPr/>
           <p:nvPr/>
-        </p:nvPicPr>
-        <p:blipFill>
-          <a:blip r:embed="rId3"/>
-          <a:stretch>
-            <a:fillRect/>
-          </a:stretch>
-        </p:blipFill>
-        <p:spPr>
+        </p:nvGrpSpPr>
+        <p:grpSpPr>
           <a:xfrm>
-            <a:off x="2306472" y="6055741"/>
-            <a:ext cx="2411057" cy="595276"/>
+            <a:off x="6771632" y="4592132"/>
+            <a:ext cx="2151655" cy="1856005"/>
+            <a:chOff x="6942710" y="4537697"/>
+            <a:chExt cx="2411057" cy="2150880"/>
           </a:xfrm>
-          <a:prstGeom prst="rect">
-            <a:avLst/>
-          </a:prstGeom>
-        </p:spPr>
-      </p:pic>
-      <p:pic>
-        <p:nvPicPr>
-          <p:cNvPr id="10" name="Picture 9" descr="A picture containing graphical user interface&#10;&#10;Description automatically generated">
-            <a:extLst>
-              <a:ext uri="{FF2B5EF4-FFF2-40B4-BE49-F238E27FC236}">
-                <a16:creationId xmlns:a16="http://schemas.microsoft.com/office/drawing/2014/main" id="{95A33E60-BD04-41E0-93CC-5B4DE9E1D273}"/>
-              </a:ext>
-            </a:extLst>
-          </p:cNvPr>
-          <p:cNvPicPr>
-            <a:picLocks noChangeAspect="1"/>
-          </p:cNvPicPr>
-          <p:nvPr/>
-        </p:nvPicPr>
-        <p:blipFill>
-          <a:blip r:embed="rId4"/>
-          <a:stretch>
-            <a:fillRect/>
-          </a:stretch>
-        </p:blipFill>
-        <p:spPr>
-          <a:xfrm>
-            <a:off x="2306472" y="5296719"/>
-            <a:ext cx="2411057" cy="536418"/>
-          </a:xfrm>
-          <a:prstGeom prst="rect">
-            <a:avLst/>
-          </a:prstGeom>
-        </p:spPr>
-      </p:pic>
-      <p:pic>
-        <p:nvPicPr>
-          <p:cNvPr id="12" name="Picture 11">
-            <a:extLst>
-              <a:ext uri="{FF2B5EF4-FFF2-40B4-BE49-F238E27FC236}">
-                <a16:creationId xmlns:a16="http://schemas.microsoft.com/office/drawing/2014/main" id="{39F6FD97-A28B-4D27-8359-34796CF0B972}"/>
-              </a:ext>
-            </a:extLst>
-          </p:cNvPr>
-          <p:cNvPicPr>
-            <a:picLocks noChangeAspect="1"/>
-          </p:cNvPicPr>
-          <p:nvPr/>
-        </p:nvPicPr>
-        <p:blipFill>
-          <a:blip r:embed="rId5"/>
-          <a:stretch>
-            <a:fillRect/>
-          </a:stretch>
-        </p:blipFill>
-        <p:spPr>
-          <a:xfrm>
-            <a:off x="6942710" y="4537697"/>
-            <a:ext cx="2201289" cy="982438"/>
-          </a:xfrm>
-          <a:prstGeom prst="rect">
-            <a:avLst/>
-          </a:prstGeom>
-        </p:spPr>
-      </p:pic>
-      <p:pic>
-        <p:nvPicPr>
-          <p:cNvPr id="14" name="Picture 13">
-            <a:extLst>
-              <a:ext uri="{FF2B5EF4-FFF2-40B4-BE49-F238E27FC236}">
-                <a16:creationId xmlns:a16="http://schemas.microsoft.com/office/drawing/2014/main" id="{B1D29318-6718-40A2-A87E-11B62EE00D97}"/>
-              </a:ext>
-            </a:extLst>
-          </p:cNvPr>
-          <p:cNvPicPr>
-            <a:picLocks noChangeAspect="1"/>
-          </p:cNvPicPr>
-          <p:nvPr/>
-        </p:nvPicPr>
-        <p:blipFill>
-          <a:blip r:embed="rId6"/>
-          <a:stretch>
-            <a:fillRect/>
-          </a:stretch>
-        </p:blipFill>
-        <p:spPr>
-          <a:xfrm>
-            <a:off x="6942710" y="5691782"/>
-            <a:ext cx="2462922" cy="996795"/>
-          </a:xfrm>
-          <a:prstGeom prst="rect">
-            <a:avLst/>
-          </a:prstGeom>
-        </p:spPr>
-      </p:pic>
+        </p:grpSpPr>
+        <p:pic>
+          <p:nvPicPr>
+            <p:cNvPr id="12" name="Picture 11">
+              <a:extLst>
+                <a:ext uri="{FF2B5EF4-FFF2-40B4-BE49-F238E27FC236}">
+                  <a16:creationId xmlns:a16="http://schemas.microsoft.com/office/drawing/2014/main" id="{39F6FD97-A28B-4D27-8359-34796CF0B972}"/>
+                </a:ext>
+              </a:extLst>
+            </p:cNvPr>
+            <p:cNvPicPr>
+              <a:picLocks noChangeAspect="1"/>
+            </p:cNvPicPr>
+            <p:nvPr/>
+          </p:nvPicPr>
+          <p:blipFill>
+            <a:blip r:embed="rId5"/>
+            <a:stretch>
+              <a:fillRect/>
+            </a:stretch>
+          </p:blipFill>
+          <p:spPr>
+            <a:xfrm>
+              <a:off x="6942710" y="4537697"/>
+              <a:ext cx="2411057" cy="982438"/>
+            </a:xfrm>
+            <a:prstGeom prst="rect">
+              <a:avLst/>
+            </a:prstGeom>
+          </p:spPr>
+        </p:pic>
+        <p:pic>
+          <p:nvPicPr>
+            <p:cNvPr id="14" name="Picture 13">
+              <a:extLst>
+                <a:ext uri="{FF2B5EF4-FFF2-40B4-BE49-F238E27FC236}">
+                  <a16:creationId xmlns:a16="http://schemas.microsoft.com/office/drawing/2014/main" id="{B1D29318-6718-40A2-A87E-11B62EE00D97}"/>
+                </a:ext>
+              </a:extLst>
+            </p:cNvPr>
+            <p:cNvPicPr>
+              <a:picLocks noChangeAspect="1"/>
+            </p:cNvPicPr>
+            <p:nvPr/>
+          </p:nvPicPr>
+          <p:blipFill>
+            <a:blip r:embed="rId6"/>
+            <a:stretch>
+              <a:fillRect/>
+            </a:stretch>
+          </p:blipFill>
+          <p:spPr>
+            <a:xfrm>
+              <a:off x="6942710" y="5691782"/>
+              <a:ext cx="2411057" cy="996795"/>
+            </a:xfrm>
+            <a:prstGeom prst="rect">
+              <a:avLst/>
+            </a:prstGeom>
+          </p:spPr>
+        </p:pic>
+      </p:grpSp>
     </p:spTree>
     <p:extLst>
       <p:ext uri="{BB962C8B-B14F-4D97-AF65-F5344CB8AC3E}">
@@ -7909,8 +8180,8 @@
         </p:nvSpPr>
         <p:spPr>
           <a:xfrm>
-            <a:off x="4568591" y="3188504"/>
-            <a:ext cx="3291658" cy="3101983"/>
+            <a:off x="1196961" y="2978780"/>
+            <a:ext cx="10034919" cy="2365008"/>
           </a:xfrm>
         </p:spPr>
         <p:txBody>
@@ -8018,13 +8289,8 @@
           <a:p>
             <a:r>
               <a:rPr lang="en-US" dirty="0"/>
-              <a:t>tailwind </a:t>
-            </a:r>
-            <a:r>
-              <a:rPr lang="en-US" dirty="0" err="1"/>
-              <a:t>css</a:t>
-            </a:r>
-            <a:endParaRPr lang="en-US" dirty="0"/>
+              <a:t>tailwind CSS</a:t>
+            </a:r>
           </a:p>
         </p:txBody>
       </p:sp>
@@ -8091,6 +8357,14 @@
 <file path=ppt/slides/slide9.xml><?xml version="1.0" encoding="utf-8"?>
 <p:sld xmlns:a="http://schemas.openxmlformats.org/drawingml/2006/main" xmlns:r="http://schemas.openxmlformats.org/officeDocument/2006/relationships" xmlns:p="http://schemas.openxmlformats.org/presentationml/2006/main">
   <p:cSld>
+    <p:bg>
+      <p:bgPr>
+        <a:solidFill>
+          <a:schemeClr val="bg2"/>
+        </a:solidFill>
+        <a:effectLst/>
+      </p:bgPr>
+    </p:bg>
     <p:spTree>
       <p:nvGrpSpPr>
         <p:cNvPr id="1" name=""/>
@@ -8121,9 +8395,16 @@
             <p:ph type="title"/>
           </p:nvPr>
         </p:nvSpPr>
-        <p:spPr/>
-        <p:txBody>
-          <a:bodyPr/>
+        <p:spPr>
+          <a:xfrm>
+            <a:off x="8312677" y="964692"/>
+            <a:ext cx="3066937" cy="1188720"/>
+          </a:xfrm>
+        </p:spPr>
+        <p:txBody>
+          <a:bodyPr>
+            <a:normAutofit/>
+          </a:bodyPr>
           <a:lstStyle/>
           <a:p>
             <a:r>
@@ -8133,6 +8414,163 @@
           </a:p>
         </p:txBody>
       </p:sp>
+      <p:sp>
+        <p:nvSpPr>
+          <p:cNvPr id="10" name="Rectangle 9">
+            <a:extLst>
+              <a:ext uri="{FF2B5EF4-FFF2-40B4-BE49-F238E27FC236}">
+                <a16:creationId xmlns:a16="http://schemas.microsoft.com/office/drawing/2014/main" id="{02A23054-E6F3-4F7A-98D5-89F7670E2EAE}"/>
+              </a:ext>
+              <a:ext uri="{C183D7F6-B498-43B3-948B-1728B52AA6E4}">
+                <adec:decorative xmlns:adec="http://schemas.microsoft.com/office/drawing/2017/decorative" val="1"/>
+              </a:ext>
+            </a:extLst>
+          </p:cNvPr>
+          <p:cNvSpPr>
+            <a:spLocks noGrp="1" noRot="1" noChangeAspect="1" noMove="1" noResize="1" noEditPoints="1" noAdjustHandles="1" noChangeArrowheads="1" noChangeShapeType="1" noTextEdit="1"/>
+          </p:cNvSpPr>
+          <p:nvPr>
+            <p:extLst>
+              <p:ext uri="{386F3935-93C4-4BCD-93E2-E3B085C9AB24}">
+                <p16:designElem xmlns:p16="http://schemas.microsoft.com/office/powerpoint/2015/main" val="1"/>
+              </p:ext>
+            </p:extLst>
+          </p:nvPr>
+        </p:nvSpPr>
+        <p:spPr>
+          <a:xfrm>
+            <a:off x="814795" y="964692"/>
+            <a:ext cx="6885432" cy="4936558"/>
+          </a:xfrm>
+          <a:prstGeom prst="rect">
+            <a:avLst/>
+          </a:prstGeom>
+          <a:noFill/>
+          <a:ln w="31750" cap="sq">
+            <a:solidFill>
+              <a:srgbClr val="FFFFFF"/>
+            </a:solidFill>
+            <a:miter lim="800000"/>
+          </a:ln>
+        </p:spPr>
+        <p:style>
+          <a:lnRef idx="2">
+            <a:schemeClr val="accent1">
+              <a:shade val="50000"/>
+            </a:schemeClr>
+          </a:lnRef>
+          <a:fillRef idx="1">
+            <a:schemeClr val="accent1"/>
+          </a:fillRef>
+          <a:effectRef idx="0">
+            <a:schemeClr val="accent1"/>
+          </a:effectRef>
+          <a:fontRef idx="minor">
+            <a:schemeClr val="lt1"/>
+          </a:fontRef>
+        </p:style>
+        <p:txBody>
+          <a:bodyPr rtlCol="0" anchor="ctr"/>
+          <a:lstStyle/>
+          <a:p>
+            <a:pPr algn="ctr"/>
+            <a:endParaRPr lang="en-US" dirty="0"/>
+          </a:p>
+        </p:txBody>
+      </p:sp>
+      <p:sp>
+        <p:nvSpPr>
+          <p:cNvPr id="12" name="Rectangle 11">
+            <a:extLst>
+              <a:ext uri="{FF2B5EF4-FFF2-40B4-BE49-F238E27FC236}">
+                <a16:creationId xmlns:a16="http://schemas.microsoft.com/office/drawing/2014/main" id="{3745B81E-78EE-472F-A0B3-8DBDBDE5BE23}"/>
+              </a:ext>
+              <a:ext uri="{C183D7F6-B498-43B3-948B-1728B52AA6E4}">
+                <adec:decorative xmlns:adec="http://schemas.microsoft.com/office/drawing/2017/decorative" val="1"/>
+              </a:ext>
+            </a:extLst>
+          </p:cNvPr>
+          <p:cNvSpPr>
+            <a:spLocks noGrp="1" noRot="1" noChangeAspect="1" noMove="1" noResize="1" noEditPoints="1" noAdjustHandles="1" noChangeArrowheads="1" noChangeShapeType="1" noTextEdit="1"/>
+          </p:cNvSpPr>
+          <p:nvPr>
+            <p:extLst>
+              <p:ext uri="{386F3935-93C4-4BCD-93E2-E3B085C9AB24}">
+                <p16:designElem xmlns:p16="http://schemas.microsoft.com/office/powerpoint/2015/main" val="1"/>
+              </p:ext>
+            </p:extLst>
+          </p:nvPr>
+        </p:nvSpPr>
+        <p:spPr>
+          <a:xfrm>
+            <a:off x="978415" y="1128683"/>
+            <a:ext cx="6558192" cy="4608576"/>
+          </a:xfrm>
+          <a:prstGeom prst="rect">
+            <a:avLst/>
+          </a:prstGeom>
+          <a:solidFill>
+            <a:srgbClr val="FFFFFF"/>
+          </a:solidFill>
+          <a:ln>
+            <a:noFill/>
+          </a:ln>
+        </p:spPr>
+        <p:style>
+          <a:lnRef idx="2">
+            <a:schemeClr val="accent1">
+              <a:shade val="50000"/>
+            </a:schemeClr>
+          </a:lnRef>
+          <a:fillRef idx="1">
+            <a:schemeClr val="accent1"/>
+          </a:fillRef>
+          <a:effectRef idx="0">
+            <a:schemeClr val="accent1"/>
+          </a:effectRef>
+          <a:fontRef idx="minor">
+            <a:schemeClr val="lt1"/>
+          </a:fontRef>
+        </p:style>
+        <p:txBody>
+          <a:bodyPr rtlCol="0" anchor="ctr"/>
+          <a:lstStyle/>
+          <a:p>
+            <a:pPr algn="ctr"/>
+            <a:endParaRPr lang="en-US"/>
+          </a:p>
+        </p:txBody>
+      </p:sp>
+      <p:pic>
+        <p:nvPicPr>
+          <p:cNvPr id="5" name="Picture 4">
+            <a:extLst>
+              <a:ext uri="{FF2B5EF4-FFF2-40B4-BE49-F238E27FC236}">
+                <a16:creationId xmlns:a16="http://schemas.microsoft.com/office/drawing/2014/main" id="{2074E092-D9A2-411C-8C4A-35BC98F6BA46}"/>
+              </a:ext>
+            </a:extLst>
+          </p:cNvPr>
+          <p:cNvPicPr>
+            <a:picLocks noChangeAspect="1"/>
+          </p:cNvPicPr>
+          <p:nvPr/>
+        </p:nvPicPr>
+        <p:blipFill>
+          <a:blip r:embed="rId2"/>
+          <a:stretch>
+            <a:fillRect/>
+          </a:stretch>
+        </p:blipFill>
+        <p:spPr>
+          <a:xfrm>
+            <a:off x="1143979" y="1852854"/>
+            <a:ext cx="6227064" cy="3160233"/>
+          </a:xfrm>
+          <a:prstGeom prst="rect">
+            <a:avLst/>
+          </a:prstGeom>
+        </p:spPr>
+      </p:pic>
       <p:sp>
         <p:nvSpPr>
           <p:cNvPr id="3" name="Content Placeholder 2">
@@ -8149,14 +8587,21 @@
             <p:ph idx="1"/>
           </p:nvPr>
         </p:nvSpPr>
-        <p:spPr/>
-        <p:txBody>
-          <a:bodyPr/>
+        <p:spPr>
+          <a:xfrm>
+            <a:off x="8311249" y="2638044"/>
+            <a:ext cx="3063765" cy="3263206"/>
+          </a:xfrm>
+        </p:spPr>
+        <p:txBody>
+          <a:bodyPr>
+            <a:normAutofit/>
+          </a:bodyPr>
           <a:lstStyle/>
           <a:p>
             <a:r>
               <a:rPr lang="en-US" dirty="0"/>
-              <a:t>1.Create Project</a:t>
+              <a:t>1.Xano to create database</a:t>
             </a:r>
           </a:p>
           <a:p>
@@ -8198,6 +8643,9 @@
               <a:rPr lang="en-US" dirty="0"/>
               <a:t>5. Test database in browser</a:t>
             </a:r>
+          </a:p>
+          <a:p>
+            <a:endParaRPr lang="en-US" dirty="0"/>
           </a:p>
         </p:txBody>
       </p:sp>

</xml_diff>